<commit_message>
Fixed documentation issue with daemon grant type
</commit_message>
<xml_diff>
--- a/Documentation/IdentitySamples.pptx
+++ b/Documentation/IdentitySamples.pptx
@@ -104,6 +104,11 @@
       </a:defRPr>
     </a:lvl9pPr>
   </p:defaultTextStyle>
+  <p:extLst>
+    <p:ext uri="{EFAFB233-063F-42B5-8137-9DF3F51BA10A}">
+      <p15:sldGuideLst xmlns:p15="http://schemas.microsoft.com/office/powerpoint/2012/main"/>
+    </p:ext>
+  </p:extLst>
 </p:presentation>
 </file>
 
@@ -238,7 +243,7 @@
           <a:p>
             <a:fld id="{197CFA03-716C-4D4E-9F41-45BA20B7DDAE}" type="datetimeFigureOut">
               <a:rPr lang="en-US" smtClean="0"/>
-              <a:t>3/16/2017</a:t>
+              <a:t>3/18/2017</a:t>
             </a:fld>
             <a:endParaRPr lang="en-US"/>
           </a:p>
@@ -408,7 +413,7 @@
           <a:p>
             <a:fld id="{197CFA03-716C-4D4E-9F41-45BA20B7DDAE}" type="datetimeFigureOut">
               <a:rPr lang="en-US" smtClean="0"/>
-              <a:t>3/16/2017</a:t>
+              <a:t>3/18/2017</a:t>
             </a:fld>
             <a:endParaRPr lang="en-US"/>
           </a:p>
@@ -588,7 +593,7 @@
           <a:p>
             <a:fld id="{197CFA03-716C-4D4E-9F41-45BA20B7DDAE}" type="datetimeFigureOut">
               <a:rPr lang="en-US" smtClean="0"/>
-              <a:t>3/16/2017</a:t>
+              <a:t>3/18/2017</a:t>
             </a:fld>
             <a:endParaRPr lang="en-US"/>
           </a:p>
@@ -758,7 +763,7 @@
           <a:p>
             <a:fld id="{197CFA03-716C-4D4E-9F41-45BA20B7DDAE}" type="datetimeFigureOut">
               <a:rPr lang="en-US" smtClean="0"/>
-              <a:t>3/16/2017</a:t>
+              <a:t>3/18/2017</a:t>
             </a:fld>
             <a:endParaRPr lang="en-US"/>
           </a:p>
@@ -1002,7 +1007,7 @@
           <a:p>
             <a:fld id="{197CFA03-716C-4D4E-9F41-45BA20B7DDAE}" type="datetimeFigureOut">
               <a:rPr lang="en-US" smtClean="0"/>
-              <a:t>3/16/2017</a:t>
+              <a:t>3/18/2017</a:t>
             </a:fld>
             <a:endParaRPr lang="en-US"/>
           </a:p>
@@ -1234,7 +1239,7 @@
           <a:p>
             <a:fld id="{197CFA03-716C-4D4E-9F41-45BA20B7DDAE}" type="datetimeFigureOut">
               <a:rPr lang="en-US" smtClean="0"/>
-              <a:t>3/16/2017</a:t>
+              <a:t>3/18/2017</a:t>
             </a:fld>
             <a:endParaRPr lang="en-US"/>
           </a:p>
@@ -1601,7 +1606,7 @@
           <a:p>
             <a:fld id="{197CFA03-716C-4D4E-9F41-45BA20B7DDAE}" type="datetimeFigureOut">
               <a:rPr lang="en-US" smtClean="0"/>
-              <a:t>3/16/2017</a:t>
+              <a:t>3/18/2017</a:t>
             </a:fld>
             <a:endParaRPr lang="en-US"/>
           </a:p>
@@ -1719,7 +1724,7 @@
           <a:p>
             <a:fld id="{197CFA03-716C-4D4E-9F41-45BA20B7DDAE}" type="datetimeFigureOut">
               <a:rPr lang="en-US" smtClean="0"/>
-              <a:t>3/16/2017</a:t>
+              <a:t>3/18/2017</a:t>
             </a:fld>
             <a:endParaRPr lang="en-US"/>
           </a:p>
@@ -1814,7 +1819,7 @@
           <a:p>
             <a:fld id="{197CFA03-716C-4D4E-9F41-45BA20B7DDAE}" type="datetimeFigureOut">
               <a:rPr lang="en-US" smtClean="0"/>
-              <a:t>3/16/2017</a:t>
+              <a:t>3/18/2017</a:t>
             </a:fld>
             <a:endParaRPr lang="en-US"/>
           </a:p>
@@ -2091,7 +2096,7 @@
           <a:p>
             <a:fld id="{197CFA03-716C-4D4E-9F41-45BA20B7DDAE}" type="datetimeFigureOut">
               <a:rPr lang="en-US" smtClean="0"/>
-              <a:t>3/16/2017</a:t>
+              <a:t>3/18/2017</a:t>
             </a:fld>
             <a:endParaRPr lang="en-US"/>
           </a:p>
@@ -2348,7 +2353,7 @@
           <a:p>
             <a:fld id="{197CFA03-716C-4D4E-9F41-45BA20B7DDAE}" type="datetimeFigureOut">
               <a:rPr lang="en-US" smtClean="0"/>
-              <a:t>3/16/2017</a:t>
+              <a:t>3/18/2017</a:t>
             </a:fld>
             <a:endParaRPr lang="en-US"/>
           </a:p>
@@ -2561,7 +2566,7 @@
           <a:p>
             <a:fld id="{197CFA03-716C-4D4E-9F41-45BA20B7DDAE}" type="datetimeFigureOut">
               <a:rPr lang="en-US" smtClean="0"/>
-              <a:t>3/16/2017</a:t>
+              <a:t>3/18/2017</a:t>
             </a:fld>
             <a:endParaRPr lang="en-US"/>
           </a:p>
@@ -3814,14 +3819,6 @@
                 </a:rPr>
                 <a:t>WPF</a:t>
               </a:r>
-              <a:endParaRPr lang="en-US" sz="2000" dirty="0">
-                <a:solidFill>
-                  <a:schemeClr val="tx1">
-                    <a:lumMod val="50000"/>
-                    <a:lumOff val="50000"/>
-                  </a:schemeClr>
-                </a:solidFill>
-              </a:endParaRPr>
             </a:p>
           </p:txBody>
         </p:sp>
@@ -4440,11 +4437,6 @@
               </a:rPr>
               <a:t>OpenID Connect</a:t>
             </a:r>
-            <a:endParaRPr lang="en-US" sz="2000">
-              <a:solidFill>
-                <a:schemeClr val="accent6"/>
-              </a:solidFill>
-            </a:endParaRPr>
           </a:p>
         </p:txBody>
       </p:sp>
@@ -4540,7 +4532,7 @@
         <p:spPr>
           <a:xfrm>
             <a:off x="3516934" y="13657934"/>
-            <a:ext cx="2134819" cy="1359255"/>
+            <a:ext cx="2134819" cy="1083677"/>
           </a:xfrm>
           <a:prstGeom prst="rect">
             <a:avLst/>
@@ -4596,22 +4588,7 @@
                   <a:schemeClr val="accent6"/>
                 </a:solidFill>
               </a:rPr>
-              <a:t>Authorization Code Grant</a:t>
-            </a:r>
-            <a:br>
-              <a:rPr lang="en-US" sz="2000" dirty="0">
-                <a:solidFill>
-                  <a:schemeClr val="accent6"/>
-                </a:solidFill>
-              </a:rPr>
-            </a:br>
-            <a:r>
-              <a:rPr lang="en-US" sz="2000" dirty="0">
-                <a:solidFill>
-                  <a:schemeClr val="accent6"/>
-                </a:solidFill>
-              </a:rPr>
-              <a:t>Confidential Client</a:t>
+              <a:t>Client Credentials Grant (X509)</a:t>
             </a:r>
           </a:p>
         </p:txBody>
@@ -4763,11 +4740,6 @@
               </a:rPr>
               <a:t>Public Client</a:t>
             </a:r>
-            <a:endParaRPr lang="en-US" sz="2000" dirty="0">
-              <a:solidFill>
-                <a:schemeClr val="accent6"/>
-              </a:solidFill>
-            </a:endParaRPr>
           </a:p>
         </p:txBody>
       </p:sp>

</xml_diff>